<commit_message>
done with stress and monkey slides
</commit_message>
<xml_diff>
--- a/Final - milestone2/milestone2presentation.pptx
+++ b/Final - milestone2/milestone2presentation.pptx
@@ -8819,7 +8819,7 @@
         </p:nvSpPr>
         <p:spPr>
           <a:xfrm>
-            <a:off x="311700" y="410000"/>
+            <a:off x="311700" y="0"/>
             <a:ext cx="8520600" cy="607800"/>
           </a:xfrm>
           <a:prstGeom prst="rect">
@@ -8861,8 +8861,8 @@
         </p:nvSpPr>
         <p:spPr>
           <a:xfrm>
-            <a:off x="223087" y="1017800"/>
-            <a:ext cx="8520600" cy="3339000"/>
+            <a:off x="311700" y="520650"/>
+            <a:ext cx="8520600" cy="4326557"/>
           </a:xfrm>
           <a:prstGeom prst="rect">
             <a:avLst/>
@@ -8876,45 +8876,68 @@
           <a:p>
             <a:pPr marL="285750" indent="-285750">
               <a:spcBef>
-                <a:spcPts val="1600"/>
-              </a:spcBef>
-              <a:spcAft>
-                <a:spcPts val="1600"/>
+                <a:spcPts val="200"/>
+              </a:spcBef>
+              <a:spcAft>
+                <a:spcPts val="200"/>
               </a:spcAft>
             </a:pPr>
             <a:r>
               <a:rPr lang="en-US" sz="1200" dirty="0"/>
-              <a:t>Stress testing is the process of determining the ability of a computer, network, program or device to maintain a certain level of effectiveness under any conditions. </a:t>
+              <a:t>The main goal of the stress testing was to reveal application bugs under high load conditions.</a:t>
             </a:r>
           </a:p>
           <a:p>
             <a:pPr marL="285750" indent="-285750">
               <a:spcBef>
-                <a:spcPts val="1600"/>
-              </a:spcBef>
-              <a:spcAft>
-                <a:spcPts val="1600"/>
+                <a:spcPts val="200"/>
+              </a:spcBef>
+              <a:spcAft>
+                <a:spcPts val="200"/>
               </a:spcAft>
             </a:pPr>
             <a:r>
               <a:rPr lang="en-US" sz="1200" dirty="0"/>
-              <a:t>In our app, we have done stress testing for 100 Processors and 100 loops. It takes around 115mins to complete the entire activity. </a:t>
+              <a:t>With this type of testing, we identified the application’s weak points such as synchronization issues, memory leaks, and race conditions.</a:t>
             </a:r>
           </a:p>
           <a:p>
-            <a:pPr marL="0" indent="0">
-              <a:spcBef>
-                <a:spcPts val="1600"/>
-              </a:spcBef>
-              <a:spcAft>
-                <a:spcPts val="1600"/>
-              </a:spcAft>
-              <a:buNone/>
+            <a:pPr marL="285750" indent="-285750">
+              <a:spcBef>
+                <a:spcPts val="200"/>
+              </a:spcBef>
+              <a:spcAft>
+                <a:spcPts val="200"/>
+              </a:spcAft>
             </a:pPr>
             <a:r>
-              <a:rPr lang="en-US" sz="1200" i="1" dirty="0"/>
-              <a:t>        </a:t>
+              <a:rPr lang="en-US" sz="1200" dirty="0"/>
+              <a:t>Also, we covered different time frames: </a:t>
             </a:r>
+          </a:p>
+          <a:p>
+            <a:pPr marL="742950" lvl="1" indent="-285750">
+              <a:spcBef>
+                <a:spcPts val="200"/>
+              </a:spcBef>
+              <a:spcAft>
+                <a:spcPts val="200"/>
+              </a:spcAft>
+            </a:pPr>
+            <a:r>
+              <a:rPr lang="en-US" sz="1100" dirty="0"/>
+              <a:t>a one-time short-term load on the system </a:t>
+            </a:r>
+          </a:p>
+          <a:p>
+            <a:pPr marL="1200150" lvl="2" indent="-285750">
+              <a:spcBef>
+                <a:spcPts val="200"/>
+              </a:spcBef>
+              <a:spcAft>
+                <a:spcPts val="200"/>
+              </a:spcAft>
+            </a:pPr>
             <a:r>
               <a:rPr lang="en-US" sz="1100" i="1" dirty="0"/>
               <a:t>./</a:t>
@@ -8941,9 +8964,190 @@
             </a:r>
             <a:r>
               <a:rPr lang="en-US" sz="1100" i="1" dirty="0"/>
-              <a:t> 5</a:t>
+              <a:t> 5  (It takes around 2mins)</a:t>
             </a:r>
-            <a:endParaRPr sz="1100" i="1" dirty="0"/>
+            <a:endParaRPr lang="en-US" sz="1100" dirty="0"/>
+          </a:p>
+          <a:p>
+            <a:pPr marL="742950" lvl="1" indent="-285750">
+              <a:spcBef>
+                <a:spcPts val="200"/>
+              </a:spcBef>
+              <a:spcAft>
+                <a:spcPts val="200"/>
+              </a:spcAft>
+            </a:pPr>
+            <a:r>
+              <a:rPr lang="en-US" sz="1100" dirty="0"/>
+              <a:t>a one-time long-term load on the system, </a:t>
+            </a:r>
+          </a:p>
+          <a:p>
+            <a:pPr marL="1200150" lvl="2" indent="-285750">
+              <a:spcBef>
+                <a:spcPts val="200"/>
+              </a:spcBef>
+              <a:spcAft>
+                <a:spcPts val="200"/>
+              </a:spcAft>
+            </a:pPr>
+            <a:r>
+              <a:rPr lang="en-US" sz="1100" i="1" dirty="0"/>
+              <a:t>./</a:t>
+            </a:r>
+            <a:r>
+              <a:rPr lang="en-US" sz="1100" i="1" dirty="0" err="1"/>
+              <a:t>StressTestApp.sh</a:t>
+            </a:r>
+            <a:r>
+              <a:rPr lang="en-US" sz="1100" i="1" dirty="0"/>
+              <a:t> -</a:t>
+            </a:r>
+            <a:r>
+              <a:rPr lang="en-US" sz="1100" i="1" dirty="0" err="1"/>
+              <a:t>NumBackGroundProcesses</a:t>
+            </a:r>
+            <a:r>
+              <a:rPr lang="en-US" sz="1100" i="1" dirty="0"/>
+              <a:t> 100 -</a:t>
+            </a:r>
+            <a:r>
+              <a:rPr lang="en-US" sz="1100" i="1" dirty="0" err="1"/>
+              <a:t>NumberLoop</a:t>
+            </a:r>
+            <a:r>
+              <a:rPr lang="en-US" sz="1100" i="1" dirty="0"/>
+              <a:t> 100  (It takes around 115mins)</a:t>
+            </a:r>
+            <a:endParaRPr lang="en-US" sz="1100" dirty="0"/>
+          </a:p>
+          <a:p>
+            <a:pPr marL="742950" lvl="1" indent="-285750">
+              <a:spcBef>
+                <a:spcPts val="200"/>
+              </a:spcBef>
+              <a:spcAft>
+                <a:spcPts val="200"/>
+              </a:spcAft>
+            </a:pPr>
+            <a:r>
+              <a:rPr lang="en-US" sz="1100" dirty="0"/>
+              <a:t>periodical short-term load on the system (In two separate windows)</a:t>
+            </a:r>
+          </a:p>
+          <a:p>
+            <a:pPr marL="1200150" lvl="2" indent="-285750">
+              <a:spcBef>
+                <a:spcPts val="200"/>
+              </a:spcBef>
+              <a:spcAft>
+                <a:spcPts val="200"/>
+              </a:spcAft>
+            </a:pPr>
+            <a:r>
+              <a:rPr lang="en-US" sz="1100" i="1" dirty="0"/>
+              <a:t>./</a:t>
+            </a:r>
+            <a:r>
+              <a:rPr lang="en-US" sz="1100" i="1" dirty="0" err="1"/>
+              <a:t>StressTestApp.sh</a:t>
+            </a:r>
+            <a:r>
+              <a:rPr lang="en-US" sz="1100" i="1" dirty="0"/>
+              <a:t> -</a:t>
+            </a:r>
+            <a:r>
+              <a:rPr lang="en-US" sz="1100" i="1" dirty="0" err="1"/>
+              <a:t>NumBackGroundProcesses</a:t>
+            </a:r>
+            <a:r>
+              <a:rPr lang="en-US" sz="1100" i="1" dirty="0"/>
+              <a:t> 5 -</a:t>
+            </a:r>
+            <a:r>
+              <a:rPr lang="en-US" sz="1100" i="1" dirty="0" err="1"/>
+              <a:t>NumberLoop</a:t>
+            </a:r>
+            <a:r>
+              <a:rPr lang="en-US" sz="1100" i="1" dirty="0"/>
+              <a:t> 5  (Still It takes same time, around 2mins)</a:t>
+            </a:r>
+            <a:endParaRPr lang="en-US" sz="1100" dirty="0"/>
+          </a:p>
+          <a:p>
+            <a:pPr marL="742950" lvl="1" indent="-285750">
+              <a:spcBef>
+                <a:spcPts val="200"/>
+              </a:spcBef>
+              <a:spcAft>
+                <a:spcPts val="200"/>
+              </a:spcAft>
+            </a:pPr>
+            <a:r>
+              <a:rPr lang="en-US" sz="1100" dirty="0"/>
+              <a:t>periodical long-term load on the system with a probability of failure of the system (In two separate windows)</a:t>
+            </a:r>
+          </a:p>
+          <a:p>
+            <a:pPr marL="1200150" lvl="2" indent="-285750">
+              <a:spcBef>
+                <a:spcPts val="200"/>
+              </a:spcBef>
+              <a:spcAft>
+                <a:spcPts val="200"/>
+              </a:spcAft>
+            </a:pPr>
+            <a:r>
+              <a:rPr lang="en-US" sz="1100" i="1" dirty="0"/>
+              <a:t>./</a:t>
+            </a:r>
+            <a:r>
+              <a:rPr lang="en-US" sz="1100" i="1" dirty="0" err="1"/>
+              <a:t>StressTestApp.sh</a:t>
+            </a:r>
+            <a:r>
+              <a:rPr lang="en-US" sz="1100" i="1" dirty="0"/>
+              <a:t> -</a:t>
+            </a:r>
+            <a:r>
+              <a:rPr lang="en-US" sz="1100" i="1" dirty="0" err="1"/>
+              <a:t>NumBackGroundProcesses</a:t>
+            </a:r>
+            <a:r>
+              <a:rPr lang="en-US" sz="1100" i="1" dirty="0"/>
+              <a:t> 100 -</a:t>
+            </a:r>
+            <a:r>
+              <a:rPr lang="en-US" sz="1100" i="1" dirty="0" err="1"/>
+              <a:t>NumberLoop</a:t>
+            </a:r>
+            <a:r>
+              <a:rPr lang="en-US" sz="1100" i="1" dirty="0"/>
+              <a:t> 100  (Script started but then PC got crashed in sometime)</a:t>
+            </a:r>
+            <a:endParaRPr lang="en-US" sz="1100" dirty="0"/>
+          </a:p>
+          <a:p>
+            <a:pPr marL="742950" lvl="1" indent="-285750">
+              <a:spcBef>
+                <a:spcPts val="200"/>
+              </a:spcBef>
+              <a:spcAft>
+                <a:spcPts val="200"/>
+              </a:spcAft>
+            </a:pPr>
+            <a:endParaRPr lang="en-US" sz="1100" dirty="0"/>
+          </a:p>
+          <a:p>
+            <a:pPr marL="1200150" lvl="2" indent="-285750">
+              <a:spcBef>
+                <a:spcPts val="200"/>
+              </a:spcBef>
+              <a:spcAft>
+                <a:spcPts val="200"/>
+              </a:spcAft>
+            </a:pPr>
+            <a:endParaRPr lang="en-US" sz="1100" dirty="0"/>
           </a:p>
         </p:txBody>
       </p:sp>
@@ -8963,13 +9167,13 @@
         </p:nvPicPr>
         <p:blipFill rotWithShape="1">
           <a:blip r:embed="rId3"/>
-          <a:srcRect r="14883"/>
+          <a:srcRect r="18740" b="26979"/>
           <a:stretch/>
         </p:blipFill>
         <p:spPr>
           <a:xfrm>
-            <a:off x="400313" y="2687300"/>
-            <a:ext cx="8431987" cy="1530183"/>
+            <a:off x="644531" y="3756902"/>
+            <a:ext cx="7854938" cy="1090305"/>
           </a:xfrm>
           <a:prstGeom prst="rect">
             <a:avLst/>
@@ -9013,7 +9217,7 @@
         </p:nvSpPr>
         <p:spPr>
           <a:xfrm>
-            <a:off x="311700" y="410000"/>
+            <a:off x="311698" y="6850"/>
             <a:ext cx="8520600" cy="607800"/>
           </a:xfrm>
           <a:prstGeom prst="rect">
@@ -9055,7 +9259,7 @@
         </p:nvSpPr>
         <p:spPr>
           <a:xfrm>
-            <a:off x="374008" y="1123343"/>
+            <a:off x="311698" y="614650"/>
             <a:ext cx="8520600" cy="3339000"/>
           </a:xfrm>
           <a:prstGeom prst="rect">
@@ -9068,37 +9272,68 @@
           </a:bodyPr>
           <a:lstStyle/>
           <a:p>
-            <a:pPr marL="171450" indent="-171450">
-              <a:lnSpc>
-                <a:spcPct val="100000"/>
-              </a:lnSpc>
-              <a:spcBef>
-                <a:spcPts val="1600"/>
-              </a:spcBef>
-              <a:spcAft>
-                <a:spcPts val="1600"/>
+            <a:pPr marL="171450" indent="-285750">
+              <a:spcBef>
+                <a:spcPts val="200"/>
+              </a:spcBef>
+              <a:spcAft>
+                <a:spcPts val="200"/>
               </a:spcAft>
             </a:pPr>
             <a:r>
               <a:rPr lang="en-US" sz="1200" dirty="0"/>
-              <a:t>The Monkey is a command line tool that runs on your emulator or device and generates random streams of user events such as clicks, touches, or gestures.</a:t>
+              <a:t>While doing this testing, we learned that it is an effective way to identify some out-of-the-box errors. </a:t>
             </a:r>
           </a:p>
           <a:p>
-            <a:pPr marL="171450" indent="-171450">
-              <a:lnSpc>
-                <a:spcPct val="100000"/>
-              </a:lnSpc>
-              <a:spcBef>
-                <a:spcPts val="1600"/>
-              </a:spcBef>
-              <a:spcAft>
-                <a:spcPts val="1600"/>
+            <a:pPr marL="171450" indent="-285750">
+              <a:spcBef>
+                <a:spcPts val="200"/>
+              </a:spcBef>
+              <a:spcAft>
+                <a:spcPts val="200"/>
               </a:spcAft>
             </a:pPr>
             <a:r>
               <a:rPr lang="en-US" sz="1200" dirty="0"/>
-              <a:t>You can run monkey command from shell environment:  </a:t>
+              <a:t>The randomness of monkey testing makes it a good way to find major bugs that can break the entire system.</a:t>
+            </a:r>
+          </a:p>
+          <a:p>
+            <a:pPr marL="171450" indent="-285750">
+              <a:spcBef>
+                <a:spcPts val="200"/>
+              </a:spcBef>
+              <a:spcAft>
+                <a:spcPts val="200"/>
+              </a:spcAft>
+            </a:pPr>
+            <a:r>
+              <a:rPr lang="en-US" sz="1200" dirty="0"/>
+              <a:t>The setup of monkey testing was quite easy. Its syntax : `</a:t>
+            </a:r>
+            <a:r>
+              <a:rPr lang="en-US" sz="1200" i="1" dirty="0" err="1"/>
+              <a:t>adb</a:t>
+            </a:r>
+            <a:r>
+              <a:rPr lang="en-US" sz="1200" i="1" dirty="0"/>
+              <a:t> shell monkey`</a:t>
+            </a:r>
+            <a:endParaRPr lang="en-US" sz="1200" dirty="0"/>
+          </a:p>
+          <a:p>
+            <a:pPr marL="171450" indent="-285750">
+              <a:spcBef>
+                <a:spcPts val="200"/>
+              </a:spcBef>
+              <a:spcAft>
+                <a:spcPts val="200"/>
+              </a:spcAft>
+            </a:pPr>
+            <a:r>
+              <a:rPr lang="en-US" sz="1200" dirty="0"/>
+              <a:t>We ran this command from android shell environment:  </a:t>
             </a:r>
             <a:r>
               <a:rPr lang="en-US" sz="1200" i="1" dirty="0"/>
@@ -9111,6 +9346,34 @@
             <a:r>
               <a:rPr lang="en-US" sz="1200" i="1" dirty="0"/>
               <a:t> shell monkey [options] &lt;event-count&gt;</a:t>
+            </a:r>
+          </a:p>
+          <a:p>
+            <a:pPr marL="628650" lvl="1" indent="-285750">
+              <a:spcBef>
+                <a:spcPts val="200"/>
+              </a:spcBef>
+              <a:spcAft>
+                <a:spcPts val="200"/>
+              </a:spcAft>
+            </a:pPr>
+            <a:r>
+              <a:rPr lang="en-US" sz="1050" i="1" dirty="0"/>
+              <a:t>[options]  = If we specify no options then it will send events to all any packages installed on your target, otherwise just mentioned package.</a:t>
+            </a:r>
+          </a:p>
+          <a:p>
+            <a:pPr marL="628650" lvl="1" indent="-285750">
+              <a:spcBef>
+                <a:spcPts val="200"/>
+              </a:spcBef>
+              <a:spcAft>
+                <a:spcPts val="200"/>
+              </a:spcAft>
+            </a:pPr>
+            <a:r>
+              <a:rPr lang="en-US" sz="1050" i="1" dirty="0"/>
+              <a:t>&lt;event-count&gt; = It is number of random events you want to send to it.</a:t>
             </a:r>
           </a:p>
         </p:txBody>
@@ -9131,13 +9394,13 @@
         </p:nvPicPr>
         <p:blipFill rotWithShape="1">
           <a:blip r:embed="rId3"/>
-          <a:srcRect r="19244"/>
+          <a:srcRect r="19244" b="14322"/>
           <a:stretch/>
         </p:blipFill>
         <p:spPr>
           <a:xfrm>
-            <a:off x="647154" y="2462209"/>
-            <a:ext cx="7849691" cy="1769315"/>
+            <a:off x="647152" y="2437736"/>
+            <a:ext cx="7849691" cy="1515914"/>
           </a:xfrm>
           <a:prstGeom prst="rect">
             <a:avLst/>

</xml_diff>